<commit_message>
Template 1o Seminário Microcontroladores 30maio2023
</commit_message>
<xml_diff>
--- a/PPT 1o Seminário Microcontroladores Wyden UniRuy & Área 1 - 2023.pptx
+++ b/PPT 1o Seminário Microcontroladores Wyden UniRuy & Área 1 - 2023.pptx
@@ -6144,7 +6144,6 @@
               <a:latin typeface="Bookman Old Style"/>
               <a:ea typeface="+mn-ea"/>
               <a:cs typeface="+mn-cs"/>
-              <a:sym typeface="Gill Sans" charset="0"/>
             </a:endParaRPr>
           </a:p>
           <a:p>
@@ -6169,8 +6168,28 @@
                 <a:cs typeface="+mn-cs"/>
                 <a:sym typeface="Gill Sans" charset="0"/>
               </a:rPr>
-              <a:t>Vista do Circuito</a:t>
-            </a:r>
+              <a:t>Vista do Circuito (Imagem </a:t>
+            </a:r>
+            <a:r>
+              <a:rPr lang="pt-BR" sz="1200" kern="1200">
+                <a:solidFill>
+                  <a:srgbClr val="887E6F"/>
+                </a:solidFill>
+                <a:latin typeface="Bookman Old Style"/>
+                <a:ea typeface="+mn-ea"/>
+                <a:cs typeface="+mn-cs"/>
+                <a:sym typeface="Gill Sans" charset="0"/>
+              </a:rPr>
+              <a:t>do projeto)</a:t>
+            </a:r>
+            <a:endParaRPr lang="pt-BR" sz="1200" kern="1200" dirty="0">
+              <a:solidFill>
+                <a:srgbClr val="887E6F"/>
+              </a:solidFill>
+              <a:latin typeface="Bookman Old Style"/>
+              <a:ea typeface="+mn-ea"/>
+              <a:cs typeface="+mn-cs"/>
+            </a:endParaRPr>
           </a:p>
           <a:p>
             <a:pPr marL="214313" indent="-214313" defTabSz="685800" hangingPunct="1">
@@ -9159,21 +9178,6 @@
 </file>
 
 <file path=customXml/item1.xml><?xml version="1.0" encoding="utf-8"?>
-<?mso-contentType ?>
-<FormTemplates xmlns="http://schemas.microsoft.com/sharepoint/v3/contenttype/forms">
-  <Display>DocumentLibraryForm</Display>
-  <Edit>DocumentLibraryForm</Edit>
-  <New>DocumentLibraryForm</New>
-</FormTemplates>
-</file>
-
-<file path=customXml/item2.xml><?xml version="1.0" encoding="utf-8"?>
-<p:properties xmlns:p="http://schemas.microsoft.com/office/2006/metadata/properties" xmlns:xsi="http://www.w3.org/2001/XMLSchema-instance" xmlns:pc="http://schemas.microsoft.com/office/infopath/2007/PartnerControls">
-  <documentManagement/>
-</p:properties>
-</file>
-
-<file path=customXml/item3.xml><?xml version="1.0" encoding="utf-8"?>
 <ct:contentTypeSchema xmlns:ct="http://schemas.microsoft.com/office/2006/metadata/contentType" xmlns:ma="http://schemas.microsoft.com/office/2006/metadata/properties/metaAttributes" ct:_="" ma:_="" ma:contentTypeName="Documento" ma:contentTypeID="0x010100E7E326A6FBD7C948AAF887265A2DB080" ma:contentTypeVersion="13" ma:contentTypeDescription="Crie um novo documento." ma:contentTypeScope="" ma:versionID="5629727caf6964b78819cfb788ada473">
   <xsd:schema xmlns:xsd="http://www.w3.org/2001/XMLSchema" xmlns:xs="http://www.w3.org/2001/XMLSchema" xmlns:p="http://schemas.microsoft.com/office/2006/metadata/properties" xmlns:ns2="bab2302b-9cf7-40b9-b316-803bc24ea342" xmlns:ns3="c298cbf6-df3b-44f4-88ee-2b3d9158f680" targetNamespace="http://schemas.microsoft.com/office/2006/metadata/properties" ma:root="true" ma:fieldsID="929990cc5bdd3bebd2af3f9d94cdeeec" ns2:_="" ns3:_="">
     <xsd:import namespace="bab2302b-9cf7-40b9-b316-803bc24ea342"/>
@@ -9396,24 +9400,22 @@
 </ct:contentTypeSchema>
 </file>
 
-<file path=customXml/itemProps1.xml><?xml version="1.0" encoding="utf-8"?>
-<ds:datastoreItem xmlns:ds="http://schemas.openxmlformats.org/officeDocument/2006/customXml" ds:itemID="{AED456AD-07D2-43E3-AD57-2C9049066662}">
-  <ds:schemaRefs>
-    <ds:schemaRef ds:uri="http://schemas.microsoft.com/sharepoint/v3/contenttype/forms"/>
-  </ds:schemaRefs>
-</ds:datastoreItem>
+<file path=customXml/item2.xml><?xml version="1.0" encoding="utf-8"?>
+<?mso-contentType ?>
+<FormTemplates xmlns="http://schemas.microsoft.com/sharepoint/v3/contenttype/forms">
+  <Display>DocumentLibraryForm</Display>
+  <Edit>DocumentLibraryForm</Edit>
+  <New>DocumentLibraryForm</New>
+</FormTemplates>
 </file>
 
-<file path=customXml/itemProps2.xml><?xml version="1.0" encoding="utf-8"?>
-<ds:datastoreItem xmlns:ds="http://schemas.openxmlformats.org/officeDocument/2006/customXml" ds:itemID="{961A30F4-F1EA-4F98-A164-76D337EE5565}">
-  <ds:schemaRefs>
-    <ds:schemaRef ds:uri="http://schemas.microsoft.com/office/2006/metadata/properties"/>
-    <ds:schemaRef ds:uri="http://schemas.microsoft.com/office/infopath/2007/PartnerControls"/>
-  </ds:schemaRefs>
-</ds:datastoreItem>
+<file path=customXml/item3.xml><?xml version="1.0" encoding="utf-8"?>
+<p:properties xmlns:p="http://schemas.microsoft.com/office/2006/metadata/properties" xmlns:xsi="http://www.w3.org/2001/XMLSchema-instance" xmlns:pc="http://schemas.microsoft.com/office/infopath/2007/PartnerControls">
+  <documentManagement/>
+</p:properties>
 </file>
 
-<file path=customXml/itemProps3.xml><?xml version="1.0" encoding="utf-8"?>
+<file path=customXml/itemProps1.xml><?xml version="1.0" encoding="utf-8"?>
 <ds:datastoreItem xmlns:ds="http://schemas.openxmlformats.org/officeDocument/2006/customXml" ds:itemID="{6A7BB859-CC6B-497C-9B96-0A0D80ADCD36}">
   <ds:schemaRefs>
     <ds:schemaRef ds:uri="http://schemas.microsoft.com/office/2006/metadata/contentType"/>
@@ -9430,4 +9432,21 @@
     <ds:schemaRef ds:uri="http://schemas.microsoft.com/internal/obd"/>
   </ds:schemaRefs>
 </ds:datastoreItem>
+</file>
+
+<file path=customXml/itemProps2.xml><?xml version="1.0" encoding="utf-8"?>
+<ds:datastoreItem xmlns:ds="http://schemas.openxmlformats.org/officeDocument/2006/customXml" ds:itemID="{AED456AD-07D2-43E3-AD57-2C9049066662}">
+  <ds:schemaRefs>
+    <ds:schemaRef ds:uri="http://schemas.microsoft.com/sharepoint/v3/contenttype/forms"/>
+  </ds:schemaRefs>
+</ds:datastoreItem>
+</file>
+
+<file path=customXml/itemProps3.xml><?xml version="1.0" encoding="utf-8"?>
+<ds:datastoreItem xmlns:ds="http://schemas.openxmlformats.org/officeDocument/2006/customXml" ds:itemID="{961A30F4-F1EA-4F98-A164-76D337EE5565}">
+  <ds:schemaRefs>
+    <ds:schemaRef ds:uri="http://schemas.microsoft.com/office/2006/metadata/properties"/>
+    <ds:schemaRef ds:uri="http://schemas.microsoft.com/office/infopath/2007/PartnerControls"/>
+  </ds:schemaRefs>
+</ds:datastoreItem>
 </file>
</xml_diff>